<commit_message>
added cpa do sym-crypt
</commit_message>
<xml_diff>
--- a/Criptografia de Chave Simetrica.pptx
+++ b/Criptografia de Chave Simetrica.pptx
@@ -27,6 +27,11 @@
     <p:sldId id="273" r:id="rId21"/>
     <p:sldId id="274" r:id="rId22"/>
     <p:sldId id="275" r:id="rId23"/>
+    <p:sldId id="278" r:id="rId24"/>
+    <p:sldId id="279" r:id="rId25"/>
+    <p:sldId id="280" r:id="rId26"/>
+    <p:sldId id="281" r:id="rId27"/>
+    <p:sldId id="282" r:id="rId28"/>
   </p:sldIdLst>
   <p:sldSz cx="9144000" cy="6858000" type="screen4x3"/>
   <p:notesSz cx="6858000" cy="9144000"/>
@@ -753,7 +758,7 @@
           <a:p>
             <a:fld id="{691FDAD1-1F9C-4638-9983-A7F22B0606AB}" type="datetimeFigureOut">
               <a:rPr lang="en-US" smtClean="0"/>
-              <a:t>5/8/2016</a:t>
+              <a:t>5/20/2016</a:t>
             </a:fld>
             <a:endParaRPr lang="en-US"/>
           </a:p>
@@ -949,7 +954,7 @@
           <a:p>
             <a:fld id="{691FDAD1-1F9C-4638-9983-A7F22B0606AB}" type="datetimeFigureOut">
               <a:rPr lang="en-US" smtClean="0"/>
-              <a:t>5/8/2016</a:t>
+              <a:t>5/20/2016</a:t>
             </a:fld>
             <a:endParaRPr lang="en-US"/>
           </a:p>
@@ -1134,7 +1139,7 @@
           <a:p>
             <a:fld id="{691FDAD1-1F9C-4638-9983-A7F22B0606AB}" type="datetimeFigureOut">
               <a:rPr lang="en-US" smtClean="0"/>
-              <a:t>5/8/2016</a:t>
+              <a:t>5/20/2016</a:t>
             </a:fld>
             <a:endParaRPr lang="en-US"/>
           </a:p>
@@ -1284,7 +1289,7 @@
           <a:p>
             <a:fld id="{691FDAD1-1F9C-4638-9983-A7F22B0606AB}" type="datetimeFigureOut">
               <a:rPr lang="en-US" smtClean="0"/>
-              <a:t>5/8/2016</a:t>
+              <a:t>5/20/2016</a:t>
             </a:fld>
             <a:endParaRPr lang="en-US"/>
           </a:p>
@@ -1539,7 +1544,7 @@
           <a:p>
             <a:fld id="{691FDAD1-1F9C-4638-9983-A7F22B0606AB}" type="datetimeFigureOut">
               <a:rPr lang="en-US" smtClean="0"/>
-              <a:t>5/8/2016</a:t>
+              <a:t>5/20/2016</a:t>
             </a:fld>
             <a:endParaRPr lang="en-US"/>
           </a:p>
@@ -1948,7 +1953,7 @@
           <a:p>
             <a:fld id="{691FDAD1-1F9C-4638-9983-A7F22B0606AB}" type="datetimeFigureOut">
               <a:rPr lang="en-US" smtClean="0"/>
-              <a:t>5/8/2016</a:t>
+              <a:t>5/20/2016</a:t>
             </a:fld>
             <a:endParaRPr lang="en-US"/>
           </a:p>
@@ -2394,7 +2399,7 @@
           <a:p>
             <a:fld id="{691FDAD1-1F9C-4638-9983-A7F22B0606AB}" type="datetimeFigureOut">
               <a:rPr lang="en-US" smtClean="0"/>
-              <a:t>5/8/2016</a:t>
+              <a:t>5/20/2016</a:t>
             </a:fld>
             <a:endParaRPr lang="en-US"/>
           </a:p>
@@ -2495,7 +2500,7 @@
           <a:p>
             <a:fld id="{691FDAD1-1F9C-4638-9983-A7F22B0606AB}" type="datetimeFigureOut">
               <a:rPr lang="en-US" smtClean="0"/>
-              <a:t>5/8/2016</a:t>
+              <a:t>5/20/2016</a:t>
             </a:fld>
             <a:endParaRPr lang="en-US"/>
           </a:p>
@@ -2616,7 +2621,7 @@
           <a:p>
             <a:fld id="{691FDAD1-1F9C-4638-9983-A7F22B0606AB}" type="datetimeFigureOut">
               <a:rPr lang="en-US" smtClean="0"/>
-              <a:t>5/8/2016</a:t>
+              <a:t>5/20/2016</a:t>
             </a:fld>
             <a:endParaRPr lang="en-US"/>
           </a:p>
@@ -2890,7 +2895,7 @@
           <a:p>
             <a:fld id="{691FDAD1-1F9C-4638-9983-A7F22B0606AB}" type="datetimeFigureOut">
               <a:rPr lang="en-US" smtClean="0"/>
-              <a:t>5/8/2016</a:t>
+              <a:t>5/20/2016</a:t>
             </a:fld>
             <a:endParaRPr lang="en-US"/>
           </a:p>
@@ -3095,7 +3100,7 @@
           <a:p>
             <a:fld id="{691FDAD1-1F9C-4638-9983-A7F22B0606AB}" type="datetimeFigureOut">
               <a:rPr lang="en-US" smtClean="0"/>
-              <a:t>5/8/2016</a:t>
+              <a:t>5/20/2016</a:t>
             </a:fld>
             <a:endParaRPr lang="en-US"/>
           </a:p>
@@ -4204,7 +4209,7 @@
           <a:p>
             <a:fld id="{691FDAD1-1F9C-4638-9983-A7F22B0606AB}" type="datetimeFigureOut">
               <a:rPr lang="en-US" smtClean="0"/>
-              <a:t>5/8/2016</a:t>
+              <a:t>5/20/2016</a:t>
             </a:fld>
             <a:endParaRPr lang="en-US"/>
           </a:p>
@@ -4732,37 +4737,7 @@
                   </a:outerShdw>
                 </a:effectLst>
               </a:rPr>
-              <a:t>Ot</a:t>
-            </a:r>
-            <a:r>
-              <a:rPr lang="en-US" sz="2400" b="1" dirty="0" err="1" smtClean="0">
-                <a:solidFill>
-                  <a:schemeClr val="bg1"/>
-                </a:solidFill>
-                <a:effectLst>
-                  <a:outerShdw blurRad="38100" dist="38100" dir="2700000" algn="tl">
-                    <a:srgbClr val="000000">
-                      <a:alpha val="43137"/>
-                    </a:srgbClr>
-                  </a:outerShdw>
-                </a:effectLst>
-              </a:rPr>
-              <a:t>á</a:t>
-            </a:r>
-            <a:r>
-              <a:rPr lang="en-US" sz="2400" b="1" dirty="0" err="1" smtClean="0">
-                <a:solidFill>
-                  <a:schemeClr val="bg1"/>
-                </a:solidFill>
-                <a:effectLst>
-                  <a:outerShdw blurRad="38100" dist="38100" dir="2700000" algn="tl">
-                    <a:srgbClr val="000000">
-                      <a:alpha val="43137"/>
-                    </a:srgbClr>
-                  </a:outerShdw>
-                </a:effectLst>
-              </a:rPr>
-              <a:t>vio</a:t>
+              <a:t>Otávio</a:t>
             </a:r>
             <a:r>
               <a:rPr lang="en-US" sz="2400" b="1" dirty="0" smtClean="0">
@@ -9724,7 +9699,212 @@
           <a:bodyPr/>
           <a:lstStyle/>
           <a:p>
-            <a:endParaRPr lang="en-US"/>
+            <a:r>
+              <a:rPr lang="en-US" dirty="0" smtClean="0"/>
+              <a:t>Um </a:t>
+            </a:r>
+            <a:r>
+              <a:rPr lang="en-US" dirty="0" err="1"/>
+              <a:t>adversário</a:t>
+            </a:r>
+            <a:r>
+              <a:rPr lang="en-US" dirty="0"/>
+              <a:t> </a:t>
+            </a:r>
+            <a:r>
+              <a:rPr lang="en-US" dirty="0" smtClean="0"/>
+              <a:t>A </a:t>
+            </a:r>
+            <a:r>
+              <a:rPr lang="en-US" dirty="0" err="1" smtClean="0"/>
+              <a:t>possui</a:t>
+            </a:r>
+            <a:r>
+              <a:rPr lang="en-US" dirty="0" smtClean="0"/>
+              <a:t> o </a:t>
+            </a:r>
+            <a:r>
+              <a:rPr lang="en-US" dirty="0" err="1" smtClean="0"/>
+              <a:t>poder</a:t>
+            </a:r>
+            <a:r>
+              <a:rPr lang="en-US" dirty="0" smtClean="0"/>
+              <a:t> de </a:t>
+            </a:r>
+            <a:r>
+              <a:rPr lang="en-US" dirty="0" err="1" smtClean="0"/>
+              <a:t>escolher</a:t>
+            </a:r>
+            <a:r>
+              <a:rPr lang="en-US" dirty="0" smtClean="0"/>
+              <a:t> </a:t>
+            </a:r>
+            <a:r>
+              <a:rPr lang="en-US" dirty="0" err="1" smtClean="0"/>
+              <a:t>mensagens</a:t>
+            </a:r>
+            <a:r>
+              <a:rPr lang="en-US" dirty="0" smtClean="0"/>
+              <a:t> </a:t>
+            </a:r>
+            <a:r>
+              <a:rPr lang="en-US" dirty="0" err="1" smtClean="0"/>
+              <a:t>para</a:t>
+            </a:r>
+            <a:r>
+              <a:rPr lang="en-US" dirty="0" smtClean="0"/>
+              <a:t> </a:t>
+            </a:r>
+            <a:r>
+              <a:rPr lang="en-US" dirty="0" err="1" smtClean="0"/>
+              <a:t>serem</a:t>
+            </a:r>
+            <a:r>
+              <a:rPr lang="en-US" dirty="0" smtClean="0"/>
+              <a:t> </a:t>
+            </a:r>
+            <a:r>
+              <a:rPr lang="en-US" dirty="0" err="1" smtClean="0"/>
+              <a:t>criptografadas</a:t>
+            </a:r>
+            <a:r>
+              <a:rPr lang="en-US" dirty="0" smtClean="0"/>
+              <a:t> e </a:t>
+            </a:r>
+            <a:r>
+              <a:rPr lang="en-US" dirty="0" err="1" smtClean="0"/>
+              <a:t>obter</a:t>
+            </a:r>
+            <a:r>
+              <a:rPr lang="en-US" dirty="0" smtClean="0"/>
+              <a:t> </a:t>
+            </a:r>
+            <a:r>
+              <a:rPr lang="en-US" dirty="0" err="1" smtClean="0"/>
+              <a:t>seus</a:t>
+            </a:r>
+            <a:r>
+              <a:rPr lang="en-US" dirty="0" smtClean="0"/>
+              <a:t> </a:t>
+            </a:r>
+            <a:r>
+              <a:rPr lang="en-US" dirty="0" err="1" smtClean="0"/>
+              <a:t>textos</a:t>
+            </a:r>
+            <a:r>
+              <a:rPr lang="en-US" dirty="0" smtClean="0"/>
+              <a:t> </a:t>
+            </a:r>
+            <a:r>
+              <a:rPr lang="en-US" dirty="0" err="1" smtClean="0"/>
+              <a:t>cifrados</a:t>
+            </a:r>
+            <a:r>
+              <a:rPr lang="en-US" dirty="0" smtClean="0"/>
+              <a:t>. Um </a:t>
+            </a:r>
+            <a:r>
+              <a:rPr lang="en-US" dirty="0" err="1" smtClean="0"/>
+              <a:t>protocolo</a:t>
+            </a:r>
+            <a:r>
+              <a:rPr lang="en-US" dirty="0" smtClean="0"/>
+              <a:t> </a:t>
+            </a:r>
+            <a:r>
+              <a:rPr lang="pt-PT" dirty="0" smtClean="0"/>
+              <a:t>é CPA-seguro se A n</a:t>
+            </a:r>
+            <a:r>
+              <a:rPr lang="en-US" dirty="0" err="1" smtClean="0"/>
+              <a:t>ão</a:t>
+            </a:r>
+            <a:r>
+              <a:rPr lang="en-US" dirty="0" smtClean="0"/>
+              <a:t> </a:t>
+            </a:r>
+            <a:r>
+              <a:rPr lang="en-US" dirty="0" err="1" smtClean="0"/>
+              <a:t>conseguir</a:t>
+            </a:r>
+            <a:r>
+              <a:rPr lang="en-US" dirty="0" smtClean="0"/>
+              <a:t> </a:t>
+            </a:r>
+            <a:r>
+              <a:rPr lang="en-US" dirty="0" err="1" smtClean="0"/>
+              <a:t>identificar</a:t>
+            </a:r>
+            <a:r>
+              <a:rPr lang="en-US" dirty="0" smtClean="0"/>
+              <a:t> </a:t>
+            </a:r>
+            <a:r>
+              <a:rPr lang="en-US" dirty="0" err="1" smtClean="0"/>
+              <a:t>qual</a:t>
+            </a:r>
+            <a:r>
+              <a:rPr lang="en-US" dirty="0" smtClean="0"/>
+              <a:t> </a:t>
+            </a:r>
+            <a:r>
+              <a:rPr lang="en-US" dirty="0" err="1" smtClean="0"/>
+              <a:t>texto</a:t>
+            </a:r>
+            <a:r>
+              <a:rPr lang="en-US" dirty="0" smtClean="0"/>
+              <a:t> </a:t>
+            </a:r>
+            <a:r>
+              <a:rPr lang="en-US" dirty="0" err="1" smtClean="0"/>
+              <a:t>cifrado</a:t>
+            </a:r>
+            <a:r>
+              <a:rPr lang="en-US" dirty="0" smtClean="0"/>
+              <a:t> </a:t>
+            </a:r>
+            <a:r>
+              <a:rPr lang="en-US" dirty="0" err="1" smtClean="0"/>
+              <a:t>corresponde</a:t>
+            </a:r>
+            <a:r>
+              <a:rPr lang="en-US" dirty="0" smtClean="0"/>
+              <a:t> a </a:t>
+            </a:r>
+            <a:r>
+              <a:rPr lang="en-US" dirty="0" err="1" smtClean="0"/>
+              <a:t>cada</a:t>
+            </a:r>
+            <a:r>
+              <a:rPr lang="en-US" dirty="0" smtClean="0"/>
+              <a:t> </a:t>
+            </a:r>
+            <a:r>
+              <a:rPr lang="en-US" dirty="0" err="1" smtClean="0"/>
+              <a:t>mensagem</a:t>
+            </a:r>
+            <a:r>
+              <a:rPr lang="en-US" dirty="0" smtClean="0"/>
+              <a:t>.</a:t>
+            </a:r>
+          </a:p>
+          <a:p>
+            <a:endParaRPr lang="en-US" dirty="0"/>
+          </a:p>
+          <a:p>
+            <a:r>
+              <a:rPr lang="en-US" dirty="0" smtClean="0"/>
+              <a:t>Ex.: </a:t>
+            </a:r>
+            <a:r>
+              <a:rPr lang="en-US" dirty="0" err="1" smtClean="0"/>
+              <a:t>Batalha</a:t>
+            </a:r>
+            <a:r>
+              <a:rPr lang="en-US" dirty="0" smtClean="0"/>
+              <a:t> de Midway</a:t>
+            </a:r>
+            <a:endParaRPr lang="en-US" dirty="0"/>
           </a:p>
         </p:txBody>
       </p:sp>
@@ -9768,6 +9948,1401 @@
       </p:par>
     </p:tnLst>
   </p:timing>
+</p:sld>
+</file>
+
+<file path=ppt/slides/slide23.xml><?xml version="1.0" encoding="utf-8"?>
+<p:sld xmlns:a="http://schemas.openxmlformats.org/drawingml/2006/main" xmlns:r="http://schemas.openxmlformats.org/officeDocument/2006/relationships" xmlns:p="http://schemas.openxmlformats.org/presentationml/2006/main">
+  <p:cSld>
+    <p:spTree>
+      <p:nvGrpSpPr>
+        <p:cNvPr id="1" name=""/>
+        <p:cNvGrpSpPr/>
+        <p:nvPr/>
+      </p:nvGrpSpPr>
+      <p:grpSpPr>
+        <a:xfrm>
+          <a:off x="0" y="0"/>
+          <a:ext cx="0" cy="0"/>
+          <a:chOff x="0" y="0"/>
+          <a:chExt cx="0" cy="0"/>
+        </a:xfrm>
+      </p:grpSpPr>
+      <p:sp>
+        <p:nvSpPr>
+          <p:cNvPr id="2" name="Content Placeholder 1"/>
+          <p:cNvSpPr>
+            <a:spLocks noGrp="1"/>
+          </p:cNvSpPr>
+          <p:nvPr>
+            <p:ph idx="1"/>
+          </p:nvPr>
+        </p:nvSpPr>
+        <p:spPr/>
+        <p:txBody>
+          <a:bodyPr>
+            <a:normAutofit fontScale="92500" lnSpcReduction="20000"/>
+          </a:bodyPr>
+          <a:lstStyle/>
+          <a:p>
+            <a:r>
+              <a:rPr lang="en-US" dirty="0" err="1"/>
+              <a:t>Definimos</a:t>
+            </a:r>
+            <a:r>
+              <a:rPr lang="en-US" dirty="0"/>
+              <a:t> um </a:t>
+            </a:r>
+            <a:r>
+              <a:rPr lang="en-US" dirty="0" err="1"/>
+              <a:t>teste</a:t>
+            </a:r>
+            <a:r>
+              <a:rPr lang="en-US" dirty="0"/>
+              <a:t> </a:t>
+            </a:r>
+            <a:r>
+              <a:rPr lang="en-US" dirty="0" err="1" smtClean="0"/>
+              <a:t>PrivCPA</a:t>
+            </a:r>
+            <a:r>
+              <a:rPr lang="en-US" baseline="-25000" dirty="0" err="1" smtClean="0"/>
+              <a:t>A</a:t>
+            </a:r>
+            <a:r>
+              <a:rPr lang="en-US" baseline="-25000" dirty="0" smtClean="0"/>
+              <a:t>,</a:t>
+            </a:r>
+            <a:r>
+              <a:rPr lang="el-GR" baseline="-25000" dirty="0"/>
+              <a:t>Π</a:t>
+            </a:r>
+            <a:r>
+              <a:rPr lang="en-US" dirty="0"/>
+              <a:t>(n)</a:t>
+            </a:r>
+          </a:p>
+          <a:p>
+            <a:pPr marL="850392" lvl="1" indent="-457200">
+              <a:buFont typeface="+mj-lt"/>
+              <a:buAutoNum type="arabicPeriod"/>
+            </a:pPr>
+            <a:r>
+              <a:rPr lang="en-US" dirty="0"/>
+              <a:t>K &lt;- </a:t>
+            </a:r>
+            <a:r>
+              <a:rPr lang="en-US" dirty="0" smtClean="0"/>
+              <a:t>Gen(1</a:t>
+            </a:r>
+            <a:r>
+              <a:rPr lang="en-US" baseline="30000" dirty="0" smtClean="0"/>
+              <a:t>n</a:t>
+            </a:r>
+            <a:r>
+              <a:rPr lang="en-US" dirty="0" smtClean="0"/>
+              <a:t>)</a:t>
+            </a:r>
+          </a:p>
+          <a:p>
+            <a:pPr marL="850392" lvl="1" indent="-457200">
+              <a:buFont typeface="+mj-lt"/>
+              <a:buAutoNum type="arabicPeriod"/>
+            </a:pPr>
+            <a:r>
+              <a:rPr lang="en-US" dirty="0" smtClean="0"/>
+              <a:t>A </a:t>
+            </a:r>
+            <a:r>
+              <a:rPr lang="en-US" dirty="0" err="1" smtClean="0"/>
+              <a:t>interage</a:t>
+            </a:r>
+            <a:r>
+              <a:rPr lang="en-US" dirty="0" smtClean="0"/>
+              <a:t> com um </a:t>
+            </a:r>
+            <a:r>
+              <a:rPr lang="en-US" dirty="0" err="1" smtClean="0"/>
+              <a:t>alvo</a:t>
+            </a:r>
+            <a:r>
+              <a:rPr lang="en-US" dirty="0" smtClean="0"/>
+              <a:t> e </a:t>
+            </a:r>
+            <a:r>
+              <a:rPr lang="en-US" dirty="0" err="1" smtClean="0"/>
+              <a:t>gera</a:t>
+            </a:r>
+            <a:r>
+              <a:rPr lang="en-US" dirty="0" smtClean="0"/>
+              <a:t> </a:t>
+            </a:r>
+            <a:r>
+              <a:rPr lang="en-US" dirty="0" err="1" smtClean="0"/>
+              <a:t>mensagens</a:t>
+            </a:r>
+            <a:r>
+              <a:rPr lang="en-US" dirty="0" smtClean="0"/>
+              <a:t> </a:t>
+            </a:r>
+            <a:r>
+              <a:rPr lang="en-US" dirty="0"/>
+              <a:t>m</a:t>
+            </a:r>
+            <a:r>
+              <a:rPr lang="en-US" baseline="-25000" dirty="0"/>
+              <a:t>0 </a:t>
+            </a:r>
+            <a:r>
+              <a:rPr lang="en-US" dirty="0"/>
+              <a:t>e m</a:t>
+            </a:r>
+            <a:r>
+              <a:rPr lang="en-US" baseline="-25000" dirty="0"/>
+              <a:t>1</a:t>
+            </a:r>
+            <a:r>
+              <a:rPr lang="en-US" dirty="0"/>
+              <a:t>∈ {0,1</a:t>
+            </a:r>
+            <a:r>
+              <a:rPr lang="en-US" dirty="0" smtClean="0"/>
+              <a:t>}</a:t>
+            </a:r>
+            <a:r>
+              <a:rPr lang="en-US" baseline="30000" dirty="0" smtClean="0"/>
+              <a:t>*</a:t>
+            </a:r>
+          </a:p>
+          <a:p>
+            <a:pPr marL="850392" lvl="1" indent="-457200">
+              <a:buFont typeface="+mj-lt"/>
+              <a:buAutoNum type="arabicPeriod"/>
+            </a:pPr>
+            <a:r>
+              <a:rPr lang="en-US" dirty="0"/>
+              <a:t>c &lt;- </a:t>
+            </a:r>
+            <a:r>
+              <a:rPr lang="en-US" dirty="0" err="1"/>
+              <a:t>Enc</a:t>
+            </a:r>
+            <a:r>
+              <a:rPr lang="en-US" baseline="-25000" dirty="0" err="1"/>
+              <a:t>k</a:t>
+            </a:r>
+            <a:r>
+              <a:rPr lang="en-US" dirty="0"/>
+              <a:t>(</a:t>
+            </a:r>
+            <a:r>
+              <a:rPr lang="en-US" dirty="0" err="1"/>
+              <a:t>m</a:t>
+            </a:r>
+            <a:r>
+              <a:rPr lang="en-US" baseline="-25000" dirty="0" err="1"/>
+              <a:t>b</a:t>
+            </a:r>
+            <a:r>
+              <a:rPr lang="en-US" dirty="0" smtClean="0"/>
+              <a:t>)</a:t>
+            </a:r>
+          </a:p>
+          <a:p>
+            <a:pPr marL="850392" lvl="1" indent="-457200">
+              <a:buFont typeface="+mj-lt"/>
+              <a:buAutoNum type="arabicPeriod"/>
+            </a:pPr>
+            <a:r>
+              <a:rPr lang="en-US" dirty="0" err="1"/>
+              <a:t>m</a:t>
+            </a:r>
+            <a:r>
+              <a:rPr lang="en-US" baseline="-25000" dirty="0" err="1"/>
+              <a:t>b</a:t>
+            </a:r>
+            <a:r>
+              <a:rPr lang="en-US" baseline="-25000" dirty="0"/>
+              <a:t>’</a:t>
+            </a:r>
+            <a:r>
+              <a:rPr lang="en-US" dirty="0"/>
+              <a:t> &lt;- A(c); A </a:t>
+            </a:r>
+            <a:r>
+              <a:rPr lang="en-US" dirty="0" err="1"/>
+              <a:t>acerta</a:t>
+            </a:r>
+            <a:r>
+              <a:rPr lang="en-US" dirty="0"/>
+              <a:t> se b’=b, </a:t>
+            </a:r>
+            <a:r>
+              <a:rPr lang="en-US" dirty="0" err="1"/>
+              <a:t>nesse</a:t>
+            </a:r>
+            <a:r>
+              <a:rPr lang="en-US" dirty="0"/>
+              <a:t> </a:t>
+            </a:r>
+            <a:r>
+              <a:rPr lang="en-US" dirty="0" err="1"/>
+              <a:t>caso</a:t>
+            </a:r>
+            <a:r>
+              <a:rPr lang="en-US" dirty="0"/>
+              <a:t> </a:t>
+            </a:r>
+            <a:r>
+              <a:rPr lang="en-US" dirty="0" err="1" smtClean="0"/>
+              <a:t>PrivCPA</a:t>
+            </a:r>
+            <a:r>
+              <a:rPr lang="en-US" baseline="-25000" dirty="0" err="1" smtClean="0"/>
+              <a:t>A</a:t>
+            </a:r>
+            <a:r>
+              <a:rPr lang="en-US" baseline="-25000" dirty="0" smtClean="0"/>
+              <a:t>,</a:t>
+            </a:r>
+            <a:r>
+              <a:rPr lang="el-GR" baseline="-25000" dirty="0"/>
+              <a:t>Π</a:t>
+            </a:r>
+            <a:r>
+              <a:rPr lang="en-US" dirty="0"/>
+              <a:t>(n)</a:t>
+            </a:r>
+            <a:r>
+              <a:rPr lang="en-US" baseline="-25000" dirty="0"/>
+              <a:t> </a:t>
+            </a:r>
+            <a:r>
+              <a:rPr lang="en-US" dirty="0" err="1"/>
+              <a:t>retorna</a:t>
+            </a:r>
+            <a:r>
+              <a:rPr lang="en-US" dirty="0"/>
+              <a:t> 1. </a:t>
+            </a:r>
+            <a:r>
+              <a:rPr lang="en-US" dirty="0" err="1"/>
+              <a:t>Caso</a:t>
+            </a:r>
+            <a:r>
+              <a:rPr lang="en-US" dirty="0"/>
+              <a:t> </a:t>
+            </a:r>
+            <a:r>
+              <a:rPr lang="en-US" dirty="0" err="1"/>
+              <a:t>contrário</a:t>
+            </a:r>
+            <a:r>
+              <a:rPr lang="en-US" dirty="0"/>
+              <a:t>, </a:t>
+            </a:r>
+            <a:r>
+              <a:rPr lang="en-US" dirty="0" err="1" smtClean="0"/>
+              <a:t>PrivCPA</a:t>
+            </a:r>
+            <a:r>
+              <a:rPr lang="en-US" baseline="-25000" dirty="0" err="1" smtClean="0"/>
+              <a:t>A</a:t>
+            </a:r>
+            <a:r>
+              <a:rPr lang="en-US" baseline="-25000" dirty="0" smtClean="0"/>
+              <a:t>,</a:t>
+            </a:r>
+            <a:r>
+              <a:rPr lang="el-GR" baseline="-25000" dirty="0"/>
+              <a:t>Π</a:t>
+            </a:r>
+            <a:r>
+              <a:rPr lang="en-US" baseline="-25000" dirty="0"/>
+              <a:t> </a:t>
+            </a:r>
+            <a:r>
+              <a:rPr lang="en-US" dirty="0"/>
+              <a:t>(n) </a:t>
+            </a:r>
+            <a:r>
+              <a:rPr lang="en-US" dirty="0" err="1"/>
+              <a:t>retorna</a:t>
+            </a:r>
+            <a:r>
+              <a:rPr lang="en-US" dirty="0"/>
+              <a:t> 0</a:t>
+            </a:r>
+          </a:p>
+          <a:p>
+            <a:pPr marL="594360" indent="-457200"/>
+            <a:endParaRPr lang="en-US" dirty="0" smtClean="0"/>
+          </a:p>
+          <a:p>
+            <a:pPr marL="594360" indent="-457200"/>
+            <a:r>
+              <a:rPr lang="el-GR" dirty="0" smtClean="0"/>
+              <a:t>Π</a:t>
+            </a:r>
+            <a:r>
+              <a:rPr lang="en-US" dirty="0" smtClean="0"/>
+              <a:t> </a:t>
+            </a:r>
+            <a:r>
+              <a:rPr lang="pt-PT" dirty="0"/>
+              <a:t>é </a:t>
+            </a:r>
+            <a:r>
+              <a:rPr lang="pt-PT" dirty="0" smtClean="0"/>
+              <a:t>CPA-seguro </a:t>
+            </a:r>
+            <a:r>
+              <a:rPr lang="pt-PT" dirty="0"/>
+              <a:t>se, para todo </a:t>
+            </a:r>
+            <a:r>
+              <a:rPr lang="en-US" dirty="0" err="1"/>
+              <a:t>adversário</a:t>
+            </a:r>
+            <a:r>
+              <a:rPr lang="en-US" dirty="0"/>
+              <a:t> A </a:t>
+            </a:r>
+            <a:r>
+              <a:rPr lang="en-US" dirty="0" err="1"/>
+              <a:t>rodando</a:t>
+            </a:r>
+            <a:r>
+              <a:rPr lang="en-US" dirty="0"/>
+              <a:t> </a:t>
+            </a:r>
+            <a:r>
+              <a:rPr lang="en-US" dirty="0" err="1"/>
+              <a:t>em</a:t>
+            </a:r>
+            <a:r>
+              <a:rPr lang="en-US" dirty="0"/>
+              <a:t> PPT, </a:t>
+            </a:r>
+            <a:r>
+              <a:rPr lang="en-US" dirty="0" err="1"/>
+              <a:t>existe</a:t>
+            </a:r>
+            <a:r>
+              <a:rPr lang="en-US" dirty="0"/>
+              <a:t> </a:t>
+            </a:r>
+            <a:r>
+              <a:rPr lang="en-US" dirty="0" err="1"/>
+              <a:t>uma</a:t>
+            </a:r>
+            <a:r>
+              <a:rPr lang="en-US" dirty="0"/>
+              <a:t> </a:t>
+            </a:r>
+            <a:r>
+              <a:rPr lang="en-US" dirty="0" err="1"/>
+              <a:t>função</a:t>
+            </a:r>
+            <a:r>
+              <a:rPr lang="en-US" dirty="0"/>
+              <a:t> </a:t>
+            </a:r>
+            <a:r>
+              <a:rPr lang="en-US" dirty="0" err="1"/>
+              <a:t>negligivel</a:t>
+            </a:r>
+            <a:r>
+              <a:rPr lang="en-US" dirty="0"/>
+              <a:t> </a:t>
+            </a:r>
+            <a:r>
+              <a:rPr lang="el-GR" dirty="0"/>
+              <a:t>ε</a:t>
+            </a:r>
+            <a:r>
+              <a:rPr lang="en-US" dirty="0"/>
+              <a:t> </a:t>
+            </a:r>
+            <a:r>
+              <a:rPr lang="en-US" dirty="0" err="1"/>
+              <a:t>tal</a:t>
+            </a:r>
+            <a:r>
+              <a:rPr lang="en-US" dirty="0"/>
+              <a:t> </a:t>
+            </a:r>
+            <a:r>
+              <a:rPr lang="en-US" dirty="0" err="1"/>
+              <a:t>que</a:t>
+            </a:r>
+            <a:endParaRPr lang="en-US" dirty="0"/>
+          </a:p>
+          <a:p>
+            <a:pPr marL="137160" indent="0">
+              <a:buNone/>
+            </a:pPr>
+            <a:endParaRPr lang="en-US" dirty="0"/>
+          </a:p>
+          <a:p>
+            <a:pPr marL="137160" indent="0">
+              <a:buNone/>
+            </a:pPr>
+            <a:r>
+              <a:rPr lang="en-US" dirty="0"/>
+              <a:t>		</a:t>
+            </a:r>
+            <a:r>
+              <a:rPr lang="en-US" dirty="0" err="1" smtClean="0"/>
+              <a:t>Pr</a:t>
+            </a:r>
+            <a:r>
+              <a:rPr lang="en-US" dirty="0" smtClean="0"/>
+              <a:t>[</a:t>
+            </a:r>
+            <a:r>
+              <a:rPr lang="en-US" dirty="0" err="1" smtClean="0"/>
+              <a:t>PrivCPA</a:t>
+            </a:r>
+            <a:r>
+              <a:rPr lang="en-US" baseline="-25000" dirty="0" err="1" smtClean="0"/>
+              <a:t>A</a:t>
+            </a:r>
+            <a:r>
+              <a:rPr lang="en-US" baseline="-25000" dirty="0" smtClean="0"/>
+              <a:t>,</a:t>
+            </a:r>
+            <a:r>
+              <a:rPr lang="el-GR" baseline="-25000" dirty="0"/>
+              <a:t>Π</a:t>
+            </a:r>
+            <a:r>
+              <a:rPr lang="en-US" dirty="0"/>
+              <a:t>(n)=1]≤ ½ + </a:t>
+            </a:r>
+            <a:r>
+              <a:rPr lang="el-GR" dirty="0"/>
+              <a:t>ε</a:t>
+            </a:r>
+            <a:r>
+              <a:rPr lang="en-US" dirty="0"/>
+              <a:t>(n)</a:t>
+            </a:r>
+          </a:p>
+          <a:p>
+            <a:pPr marL="850392" lvl="1" indent="-457200">
+              <a:buFont typeface="+mj-lt"/>
+              <a:buAutoNum type="arabicPeriod"/>
+            </a:pPr>
+            <a:endParaRPr lang="en-US" dirty="0"/>
+          </a:p>
+          <a:p>
+            <a:pPr marL="850392" lvl="1" indent="-457200">
+              <a:buFont typeface="+mj-lt"/>
+              <a:buAutoNum type="arabicPeriod"/>
+            </a:pPr>
+            <a:endParaRPr lang="en-US" dirty="0"/>
+          </a:p>
+        </p:txBody>
+      </p:sp>
+      <p:sp>
+        <p:nvSpPr>
+          <p:cNvPr id="3" name="Title 2"/>
+          <p:cNvSpPr>
+            <a:spLocks noGrp="1"/>
+          </p:cNvSpPr>
+          <p:nvPr>
+            <p:ph type="title"/>
+          </p:nvPr>
+        </p:nvSpPr>
+        <p:spPr/>
+        <p:txBody>
+          <a:bodyPr/>
+          <a:lstStyle/>
+          <a:p>
+            <a:r>
+              <a:rPr lang="en-US" dirty="0" smtClean="0"/>
+              <a:t>CPA-Security (Formal)</a:t>
+            </a:r>
+            <a:endParaRPr lang="en-US" dirty="0"/>
+          </a:p>
+        </p:txBody>
+      </p:sp>
+    </p:spTree>
+    <p:extLst>
+      <p:ext uri="{BB962C8B-B14F-4D97-AF65-F5344CB8AC3E}">
+        <p14:creationId xmlns:p14="http://schemas.microsoft.com/office/powerpoint/2010/main" val="2454237458"/>
+      </p:ext>
+    </p:extLst>
+  </p:cSld>
+  <p:clrMapOvr>
+    <a:masterClrMapping/>
+  </p:clrMapOvr>
+</p:sld>
+</file>
+
+<file path=ppt/slides/slide24.xml><?xml version="1.0" encoding="utf-8"?>
+<p:sld xmlns:a="http://schemas.openxmlformats.org/drawingml/2006/main" xmlns:r="http://schemas.openxmlformats.org/officeDocument/2006/relationships" xmlns:p="http://schemas.openxmlformats.org/presentationml/2006/main">
+  <p:cSld>
+    <p:spTree>
+      <p:nvGrpSpPr>
+        <p:cNvPr id="1" name=""/>
+        <p:cNvGrpSpPr/>
+        <p:nvPr/>
+      </p:nvGrpSpPr>
+      <p:grpSpPr>
+        <a:xfrm>
+          <a:off x="0" y="0"/>
+          <a:ext cx="0" cy="0"/>
+          <a:chOff x="0" y="0"/>
+          <a:chExt cx="0" cy="0"/>
+        </a:xfrm>
+      </p:grpSpPr>
+      <p:sp>
+        <p:nvSpPr>
+          <p:cNvPr id="2" name="Content Placeholder 1"/>
+          <p:cNvSpPr>
+            <a:spLocks noGrp="1"/>
+          </p:cNvSpPr>
+          <p:nvPr>
+            <p:ph idx="1"/>
+          </p:nvPr>
+        </p:nvSpPr>
+        <p:spPr/>
+        <p:txBody>
+          <a:bodyPr/>
+          <a:lstStyle/>
+          <a:p>
+            <a:r>
+              <a:rPr lang="en-US" dirty="0" err="1" smtClean="0"/>
+              <a:t>Considere</a:t>
+            </a:r>
+            <a:r>
+              <a:rPr lang="en-US" dirty="0" smtClean="0"/>
+              <a:t> o </a:t>
+            </a:r>
+            <a:r>
+              <a:rPr lang="en-US" dirty="0" err="1" smtClean="0"/>
+              <a:t>seguinte</a:t>
+            </a:r>
+            <a:r>
+              <a:rPr lang="en-US" dirty="0" smtClean="0"/>
+              <a:t> A:</a:t>
+            </a:r>
+          </a:p>
+          <a:p>
+            <a:pPr marL="850392" lvl="1" indent="-457200">
+              <a:buFont typeface="+mj-lt"/>
+              <a:buAutoNum type="arabicPeriod"/>
+            </a:pPr>
+            <a:r>
+              <a:rPr lang="en-US" dirty="0" err="1" smtClean="0"/>
+              <a:t>Obtem</a:t>
+            </a:r>
+            <a:r>
+              <a:rPr lang="en-US" dirty="0" smtClean="0"/>
+              <a:t>-se c</a:t>
+            </a:r>
+            <a:r>
+              <a:rPr lang="en-US" baseline="-25000" dirty="0" smtClean="0"/>
+              <a:t>0 </a:t>
+            </a:r>
+            <a:r>
+              <a:rPr lang="en-US" dirty="0" smtClean="0"/>
+              <a:t>&lt;- </a:t>
+            </a:r>
+            <a:r>
+              <a:rPr lang="en-US" dirty="0" err="1" smtClean="0"/>
+              <a:t>Enc</a:t>
+            </a:r>
+            <a:r>
+              <a:rPr lang="en-US" baseline="-25000" dirty="0" err="1" smtClean="0"/>
+              <a:t>k</a:t>
+            </a:r>
+            <a:r>
+              <a:rPr lang="en-US" dirty="0" smtClean="0"/>
+              <a:t>(m</a:t>
+            </a:r>
+            <a:r>
+              <a:rPr lang="en-US" baseline="-25000" dirty="0" smtClean="0"/>
+              <a:t>0</a:t>
+            </a:r>
+            <a:r>
+              <a:rPr lang="en-US" dirty="0" smtClean="0"/>
+              <a:t>) e c</a:t>
+            </a:r>
+            <a:r>
+              <a:rPr lang="en-US" baseline="-25000" dirty="0" smtClean="0"/>
+              <a:t>1 </a:t>
+            </a:r>
+            <a:r>
+              <a:rPr lang="en-US" dirty="0"/>
+              <a:t>&lt;- </a:t>
+            </a:r>
+            <a:r>
+              <a:rPr lang="en-US" dirty="0" err="1" smtClean="0"/>
+              <a:t>Enc</a:t>
+            </a:r>
+            <a:r>
+              <a:rPr lang="en-US" baseline="-25000" dirty="0" err="1" smtClean="0"/>
+              <a:t>k</a:t>
+            </a:r>
+            <a:r>
+              <a:rPr lang="en-US" dirty="0" smtClean="0"/>
+              <a:t>(m</a:t>
+            </a:r>
+            <a:r>
+              <a:rPr lang="en-US" baseline="-25000" dirty="0" smtClean="0"/>
+              <a:t>1</a:t>
+            </a:r>
+            <a:r>
+              <a:rPr lang="en-US" dirty="0" smtClean="0"/>
+              <a:t>) </a:t>
+            </a:r>
+          </a:p>
+          <a:p>
+            <a:pPr marL="850392" lvl="1" indent="-457200">
+              <a:buFont typeface="+mj-lt"/>
+              <a:buAutoNum type="arabicPeriod"/>
+            </a:pPr>
+            <a:r>
+              <a:rPr lang="en-US" dirty="0" smtClean="0"/>
+              <a:t>A </a:t>
+            </a:r>
+            <a:r>
+              <a:rPr lang="en-US" dirty="0" err="1" smtClean="0"/>
+              <a:t>escolhe</a:t>
+            </a:r>
+            <a:r>
+              <a:rPr lang="en-US" dirty="0" smtClean="0"/>
+              <a:t> </a:t>
+            </a:r>
+            <a:r>
+              <a:rPr lang="en-US" dirty="0" err="1" smtClean="0"/>
+              <a:t>então</a:t>
+            </a:r>
+            <a:r>
+              <a:rPr lang="en-US" dirty="0" smtClean="0"/>
+              <a:t> </a:t>
+            </a:r>
+            <a:r>
+              <a:rPr lang="en-US" dirty="0" err="1" smtClean="0"/>
+              <a:t>m</a:t>
+            </a:r>
+            <a:r>
+              <a:rPr lang="en-US" baseline="-25000" dirty="0" err="1" smtClean="0"/>
+              <a:t>b</a:t>
+            </a:r>
+            <a:r>
+              <a:rPr lang="en-US" dirty="0" smtClean="0"/>
+              <a:t> e </a:t>
+            </a:r>
+            <a:r>
+              <a:rPr lang="en-US" dirty="0" err="1" smtClean="0"/>
+              <a:t>obtem</a:t>
+            </a:r>
+            <a:r>
+              <a:rPr lang="en-US" dirty="0" smtClean="0"/>
+              <a:t> </a:t>
+            </a:r>
+            <a:r>
+              <a:rPr lang="en-US" dirty="0"/>
+              <a:t>c &lt;- </a:t>
+            </a:r>
+            <a:r>
+              <a:rPr lang="en-US" dirty="0" err="1"/>
+              <a:t>Enc</a:t>
+            </a:r>
+            <a:r>
+              <a:rPr lang="en-US" baseline="-25000" dirty="0" err="1"/>
+              <a:t>k</a:t>
+            </a:r>
+            <a:r>
+              <a:rPr lang="en-US" dirty="0"/>
+              <a:t>(</a:t>
+            </a:r>
+            <a:r>
+              <a:rPr lang="en-US" dirty="0" err="1"/>
+              <a:t>m</a:t>
+            </a:r>
+            <a:r>
+              <a:rPr lang="en-US" baseline="-25000" dirty="0" err="1"/>
+              <a:t>b</a:t>
+            </a:r>
+            <a:r>
+              <a:rPr lang="en-US" dirty="0"/>
+              <a:t>)</a:t>
+            </a:r>
+          </a:p>
+          <a:p>
+            <a:pPr marL="850392" lvl="1" indent="-457200">
+              <a:buFont typeface="+mj-lt"/>
+              <a:buAutoNum type="arabicPeriod"/>
+            </a:pPr>
+            <a:r>
+              <a:rPr lang="en-US" dirty="0" smtClean="0"/>
+              <a:t>Se c=</a:t>
+            </a:r>
+            <a:r>
+              <a:rPr lang="en-US" dirty="0"/>
+              <a:t> </a:t>
+            </a:r>
+            <a:r>
+              <a:rPr lang="en-US" dirty="0" smtClean="0"/>
+              <a:t>c</a:t>
+            </a:r>
+            <a:r>
+              <a:rPr lang="en-US" baseline="-25000" dirty="0" smtClean="0"/>
+              <a:t>0, </a:t>
+            </a:r>
+            <a:r>
+              <a:rPr lang="en-US" dirty="0" err="1" smtClean="0"/>
+              <a:t>m</a:t>
+            </a:r>
+            <a:r>
+              <a:rPr lang="en-US" baseline="-25000" dirty="0" err="1" smtClean="0"/>
+              <a:t>b</a:t>
+            </a:r>
+            <a:r>
+              <a:rPr lang="en-US" baseline="-25000" dirty="0" smtClean="0"/>
+              <a:t> </a:t>
+            </a:r>
+            <a:r>
+              <a:rPr lang="en-US" dirty="0" smtClean="0"/>
+              <a:t>= m</a:t>
+            </a:r>
+            <a:r>
+              <a:rPr lang="en-US" baseline="-25000" dirty="0" smtClean="0"/>
+              <a:t>0 </a:t>
+            </a:r>
+            <a:r>
+              <a:rPr lang="en-US" dirty="0" smtClean="0"/>
+              <a:t>e se </a:t>
+            </a:r>
+            <a:r>
+              <a:rPr lang="en-US" dirty="0"/>
+              <a:t>c= </a:t>
+            </a:r>
+            <a:r>
+              <a:rPr lang="en-US" dirty="0" smtClean="0"/>
+              <a:t>c</a:t>
+            </a:r>
+            <a:r>
+              <a:rPr lang="en-US" baseline="-25000" dirty="0" smtClean="0"/>
+              <a:t>1, </a:t>
+            </a:r>
+            <a:r>
+              <a:rPr lang="en-US" dirty="0" err="1"/>
+              <a:t>m</a:t>
+            </a:r>
+            <a:r>
+              <a:rPr lang="en-US" baseline="-25000" dirty="0" err="1"/>
+              <a:t>b</a:t>
+            </a:r>
+            <a:r>
+              <a:rPr lang="en-US" baseline="-25000" dirty="0"/>
+              <a:t> </a:t>
+            </a:r>
+            <a:r>
+              <a:rPr lang="en-US" dirty="0"/>
+              <a:t>= </a:t>
+            </a:r>
+            <a:r>
+              <a:rPr lang="en-US" dirty="0" smtClean="0"/>
+              <a:t>m</a:t>
+            </a:r>
+            <a:r>
+              <a:rPr lang="en-US" baseline="-25000" dirty="0" smtClean="0"/>
+              <a:t>1 </a:t>
+            </a:r>
+          </a:p>
+          <a:p>
+            <a:pPr marL="850392" lvl="1" indent="-457200">
+              <a:buFont typeface="+mj-lt"/>
+              <a:buAutoNum type="arabicPeriod"/>
+            </a:pPr>
+            <a:r>
+              <a:rPr lang="en-US" dirty="0" smtClean="0"/>
+              <a:t>A </a:t>
+            </a:r>
+            <a:r>
+              <a:rPr lang="en-US" dirty="0" err="1" smtClean="0"/>
+              <a:t>obtem</a:t>
+            </a:r>
+            <a:r>
+              <a:rPr lang="en-US" dirty="0" smtClean="0"/>
+              <a:t> </a:t>
+            </a:r>
+            <a:r>
+              <a:rPr lang="en-US" dirty="0" err="1" smtClean="0"/>
+              <a:t>exito</a:t>
+            </a:r>
+            <a:r>
+              <a:rPr lang="en-US" dirty="0" smtClean="0"/>
+              <a:t> com </a:t>
+            </a:r>
+            <a:r>
+              <a:rPr lang="en-US" dirty="0" err="1" smtClean="0"/>
+              <a:t>probabilidade</a:t>
+            </a:r>
+            <a:r>
+              <a:rPr lang="en-US" dirty="0" smtClean="0"/>
+              <a:t> de 100%!</a:t>
+            </a:r>
+          </a:p>
+          <a:p>
+            <a:pPr marL="850392" lvl="1" indent="-457200">
+              <a:buFont typeface="+mj-lt"/>
+              <a:buAutoNum type="arabicPeriod"/>
+            </a:pPr>
+            <a:endParaRPr lang="en-US" dirty="0" smtClean="0"/>
+          </a:p>
+          <a:p>
+            <a:pPr marL="594360" indent="-457200"/>
+            <a:r>
+              <a:rPr lang="en-US" dirty="0" err="1" smtClean="0"/>
+              <a:t>Conclusão</a:t>
+            </a:r>
+            <a:r>
+              <a:rPr lang="en-US" dirty="0" smtClean="0"/>
+              <a:t>: Para </a:t>
+            </a:r>
+            <a:r>
+              <a:rPr lang="en-US" dirty="0" err="1" smtClean="0"/>
+              <a:t>ser</a:t>
+            </a:r>
+            <a:r>
+              <a:rPr lang="en-US" dirty="0" smtClean="0"/>
+              <a:t> CPA-</a:t>
+            </a:r>
+            <a:r>
+              <a:rPr lang="en-US" dirty="0" err="1" smtClean="0"/>
+              <a:t>seguro</a:t>
+            </a:r>
+            <a:r>
+              <a:rPr lang="en-US" dirty="0" smtClean="0"/>
+              <a:t> um </a:t>
+            </a:r>
+            <a:r>
+              <a:rPr lang="en-US" dirty="0" err="1" smtClean="0"/>
+              <a:t>protocolo</a:t>
+            </a:r>
+            <a:r>
+              <a:rPr lang="en-US" dirty="0" smtClean="0"/>
+              <a:t> </a:t>
+            </a:r>
+            <a:r>
+              <a:rPr lang="en-US" dirty="0" err="1" smtClean="0"/>
+              <a:t>não</a:t>
+            </a:r>
+            <a:r>
+              <a:rPr lang="en-US" dirty="0" smtClean="0"/>
+              <a:t> </a:t>
+            </a:r>
+            <a:r>
+              <a:rPr lang="en-US" dirty="0" err="1" smtClean="0"/>
+              <a:t>pode</a:t>
+            </a:r>
+            <a:r>
+              <a:rPr lang="en-US" dirty="0" smtClean="0"/>
+              <a:t> </a:t>
+            </a:r>
+            <a:r>
+              <a:rPr lang="en-US" dirty="0" err="1" smtClean="0"/>
+              <a:t>ser</a:t>
+            </a:r>
+            <a:r>
+              <a:rPr lang="en-US" dirty="0" smtClean="0"/>
+              <a:t> </a:t>
+            </a:r>
+            <a:r>
+              <a:rPr lang="en-US" dirty="0" err="1" smtClean="0"/>
+              <a:t>deterministico</a:t>
+            </a:r>
+            <a:r>
+              <a:rPr lang="en-US" dirty="0" smtClean="0"/>
+              <a:t>!</a:t>
+            </a:r>
+          </a:p>
+        </p:txBody>
+      </p:sp>
+      <p:sp>
+        <p:nvSpPr>
+          <p:cNvPr id="3" name="Title 2"/>
+          <p:cNvSpPr>
+            <a:spLocks noGrp="1"/>
+          </p:cNvSpPr>
+          <p:nvPr>
+            <p:ph type="title"/>
+          </p:nvPr>
+        </p:nvSpPr>
+        <p:spPr/>
+        <p:txBody>
+          <a:bodyPr/>
+          <a:lstStyle/>
+          <a:p>
+            <a:r>
+              <a:rPr lang="en-US" dirty="0" err="1" smtClean="0"/>
+              <a:t>Impossivel</a:t>
+            </a:r>
+            <a:r>
+              <a:rPr lang="en-US" dirty="0" smtClean="0"/>
+              <a:t>?</a:t>
+            </a:r>
+            <a:endParaRPr lang="en-US" dirty="0"/>
+          </a:p>
+        </p:txBody>
+      </p:sp>
+    </p:spTree>
+    <p:extLst>
+      <p:ext uri="{BB962C8B-B14F-4D97-AF65-F5344CB8AC3E}">
+        <p14:creationId xmlns:p14="http://schemas.microsoft.com/office/powerpoint/2010/main" val="2194474798"/>
+      </p:ext>
+    </p:extLst>
+  </p:cSld>
+  <p:clrMapOvr>
+    <a:masterClrMapping/>
+  </p:clrMapOvr>
+</p:sld>
+</file>
+
+<file path=ppt/slides/slide25.xml><?xml version="1.0" encoding="utf-8"?>
+<p:sld xmlns:a="http://schemas.openxmlformats.org/drawingml/2006/main" xmlns:r="http://schemas.openxmlformats.org/officeDocument/2006/relationships" xmlns:p="http://schemas.openxmlformats.org/presentationml/2006/main">
+  <p:cSld>
+    <p:spTree>
+      <p:nvGrpSpPr>
+        <p:cNvPr id="1" name=""/>
+        <p:cNvGrpSpPr/>
+        <p:nvPr/>
+      </p:nvGrpSpPr>
+      <p:grpSpPr>
+        <a:xfrm>
+          <a:off x="0" y="0"/>
+          <a:ext cx="0" cy="0"/>
+          <a:chOff x="0" y="0"/>
+          <a:chExt cx="0" cy="0"/>
+        </a:xfrm>
+      </p:grpSpPr>
+      <p:sp>
+        <p:nvSpPr>
+          <p:cNvPr id="2" name="Content Placeholder 1"/>
+          <p:cNvSpPr>
+            <a:spLocks noGrp="1"/>
+          </p:cNvSpPr>
+          <p:nvPr>
+            <p:ph idx="1"/>
+          </p:nvPr>
+        </p:nvSpPr>
+        <p:spPr/>
+        <p:txBody>
+          <a:bodyPr/>
+          <a:lstStyle/>
+          <a:p>
+            <a:endParaRPr lang="en-US"/>
+          </a:p>
+        </p:txBody>
+      </p:sp>
+      <p:sp>
+        <p:nvSpPr>
+          <p:cNvPr id="3" name="Title 2"/>
+          <p:cNvSpPr>
+            <a:spLocks noGrp="1"/>
+          </p:cNvSpPr>
+          <p:nvPr>
+            <p:ph type="title"/>
+          </p:nvPr>
+        </p:nvSpPr>
+        <p:spPr/>
+        <p:txBody>
+          <a:bodyPr/>
+          <a:lstStyle/>
+          <a:p>
+            <a:r>
+              <a:rPr lang="en-US" dirty="0" smtClean="0"/>
+              <a:t>Block Cipher</a:t>
+            </a:r>
+            <a:endParaRPr lang="en-US" dirty="0"/>
+          </a:p>
+        </p:txBody>
+      </p:sp>
+    </p:spTree>
+    <p:extLst>
+      <p:ext uri="{BB962C8B-B14F-4D97-AF65-F5344CB8AC3E}">
+        <p14:creationId xmlns:p14="http://schemas.microsoft.com/office/powerpoint/2010/main" val="173283324"/>
+      </p:ext>
+    </p:extLst>
+  </p:cSld>
+  <p:clrMapOvr>
+    <a:masterClrMapping/>
+  </p:clrMapOvr>
+</p:sld>
+</file>
+
+<file path=ppt/slides/slide26.xml><?xml version="1.0" encoding="utf-8"?>
+<p:sld xmlns:a="http://schemas.openxmlformats.org/drawingml/2006/main" xmlns:r="http://schemas.openxmlformats.org/officeDocument/2006/relationships" xmlns:p="http://schemas.openxmlformats.org/presentationml/2006/main">
+  <p:cSld>
+    <p:spTree>
+      <p:nvGrpSpPr>
+        <p:cNvPr id="1" name=""/>
+        <p:cNvGrpSpPr/>
+        <p:nvPr/>
+      </p:nvGrpSpPr>
+      <p:grpSpPr>
+        <a:xfrm>
+          <a:off x="0" y="0"/>
+          <a:ext cx="0" cy="0"/>
+          <a:chOff x="0" y="0"/>
+          <a:chExt cx="0" cy="0"/>
+        </a:xfrm>
+      </p:grpSpPr>
+      <p:sp>
+        <p:nvSpPr>
+          <p:cNvPr id="2" name="Content Placeholder 1"/>
+          <p:cNvSpPr>
+            <a:spLocks noGrp="1"/>
+          </p:cNvSpPr>
+          <p:nvPr>
+            <p:ph idx="1"/>
+          </p:nvPr>
+        </p:nvSpPr>
+        <p:spPr/>
+        <p:txBody>
+          <a:bodyPr/>
+          <a:lstStyle/>
+          <a:p>
+            <a:r>
+              <a:rPr lang="en-US" dirty="0" err="1" smtClean="0"/>
+              <a:t>Seja</a:t>
+            </a:r>
+            <a:r>
+              <a:rPr lang="en-US" dirty="0" smtClean="0"/>
+              <a:t> F um Block Cipher</a:t>
+            </a:r>
+          </a:p>
+          <a:p>
+            <a:pPr marL="880110" lvl="1" indent="-514350">
+              <a:buFont typeface="+mj-lt"/>
+              <a:buAutoNum type="arabicPeriod"/>
+            </a:pPr>
+            <a:r>
+              <a:rPr lang="en-US" dirty="0"/>
+              <a:t>K &lt;- Gen(1</a:t>
+            </a:r>
+            <a:r>
+              <a:rPr lang="en-US" baseline="30000" dirty="0"/>
+              <a:t>n</a:t>
+            </a:r>
+            <a:r>
+              <a:rPr lang="en-US" dirty="0" smtClean="0"/>
+              <a:t>)</a:t>
+            </a:r>
+          </a:p>
+          <a:p>
+            <a:pPr marL="880110" lvl="1" indent="-514350">
+              <a:buFont typeface="+mj-lt"/>
+              <a:buAutoNum type="arabicPeriod"/>
+            </a:pPr>
+            <a:r>
+              <a:rPr lang="en-US" dirty="0" err="1" smtClean="0"/>
+              <a:t>Enc</a:t>
+            </a:r>
+            <a:r>
+              <a:rPr lang="en-US" baseline="-25000" dirty="0" err="1" smtClean="0"/>
+              <a:t>k</a:t>
+            </a:r>
+            <a:r>
+              <a:rPr lang="en-US" dirty="0" smtClean="0"/>
+              <a:t>(m), |m|=|k|:</a:t>
+            </a:r>
+          </a:p>
+          <a:p>
+            <a:pPr marL="1117854" lvl="2" indent="-514350">
+              <a:buFont typeface="+mj-lt"/>
+              <a:buAutoNum type="arabicPeriod"/>
+            </a:pPr>
+            <a:r>
+              <a:rPr lang="en-US" dirty="0" err="1" smtClean="0"/>
+              <a:t>Escolhe</a:t>
+            </a:r>
+            <a:r>
+              <a:rPr lang="en-US" dirty="0" smtClean="0"/>
+              <a:t>-se </a:t>
+            </a:r>
+            <a:r>
+              <a:rPr lang="en-US" dirty="0" err="1" smtClean="0"/>
+              <a:t>aleatoriamente</a:t>
+            </a:r>
+            <a:r>
+              <a:rPr lang="en-US" dirty="0" smtClean="0"/>
+              <a:t> r </a:t>
+            </a:r>
+            <a:r>
+              <a:rPr lang="en-US" dirty="0"/>
+              <a:t>∈ {</a:t>
+            </a:r>
+            <a:r>
+              <a:rPr lang="en-US" dirty="0" smtClean="0"/>
+              <a:t>0,1}</a:t>
+            </a:r>
+            <a:r>
+              <a:rPr lang="en-US" baseline="30000" dirty="0" smtClean="0"/>
+              <a:t>n</a:t>
+            </a:r>
+          </a:p>
+          <a:p>
+            <a:pPr marL="1117854" lvl="2" indent="-514350">
+              <a:buFont typeface="+mj-lt"/>
+              <a:buAutoNum type="arabicPeriod"/>
+            </a:pPr>
+            <a:r>
+              <a:rPr lang="en-US" dirty="0"/>
+              <a:t>c</a:t>
+            </a:r>
+            <a:r>
+              <a:rPr lang="en-US" dirty="0" smtClean="0"/>
+              <a:t> &lt;- &lt; r , </a:t>
+            </a:r>
+            <a:r>
+              <a:rPr lang="en-US" dirty="0" err="1" smtClean="0"/>
+              <a:t>F</a:t>
+            </a:r>
+            <a:r>
+              <a:rPr lang="en-US" baseline="-25000" dirty="0" err="1" smtClean="0"/>
+              <a:t>k</a:t>
+            </a:r>
+            <a:r>
+              <a:rPr lang="en-US" dirty="0" smtClean="0"/>
+              <a:t>(r)⊕m&gt;</a:t>
+            </a:r>
+            <a:endParaRPr lang="en-US" dirty="0"/>
+          </a:p>
+          <a:p>
+            <a:pPr marL="880110" lvl="1" indent="-514350">
+              <a:buFont typeface="+mj-lt"/>
+              <a:buAutoNum type="arabicPeriod"/>
+            </a:pPr>
+            <a:r>
+              <a:rPr lang="en-US" dirty="0" smtClean="0"/>
+              <a:t>Dec</a:t>
+            </a:r>
+            <a:r>
+              <a:rPr lang="en-US" baseline="-25000" dirty="0" smtClean="0"/>
+              <a:t>k</a:t>
+            </a:r>
+            <a:r>
+              <a:rPr lang="en-US" dirty="0" smtClean="0"/>
+              <a:t>(&lt;c</a:t>
+            </a:r>
+            <a:r>
+              <a:rPr lang="en-US" baseline="-25000" dirty="0" smtClean="0"/>
+              <a:t>1</a:t>
+            </a:r>
+            <a:r>
+              <a:rPr lang="en-US" dirty="0" smtClean="0"/>
+              <a:t>,c</a:t>
+            </a:r>
+            <a:r>
+              <a:rPr lang="en-US" baseline="-25000" dirty="0" smtClean="0"/>
+              <a:t>2</a:t>
+            </a:r>
+            <a:r>
+              <a:rPr lang="en-US" dirty="0" smtClean="0"/>
+              <a:t>&gt;) = c</a:t>
+            </a:r>
+            <a:r>
+              <a:rPr lang="en-US" baseline="-25000" dirty="0" smtClean="0"/>
+              <a:t>2</a:t>
+            </a:r>
+            <a:r>
+              <a:rPr lang="en-US" dirty="0"/>
+              <a:t> </a:t>
+            </a:r>
+            <a:r>
+              <a:rPr lang="en-US" dirty="0" smtClean="0"/>
+              <a:t>⊕ </a:t>
+            </a:r>
+            <a:r>
+              <a:rPr lang="en-US" dirty="0" err="1" smtClean="0"/>
+              <a:t>F</a:t>
+            </a:r>
+            <a:r>
+              <a:rPr lang="en-US" baseline="-25000" dirty="0" err="1" smtClean="0"/>
+              <a:t>k</a:t>
+            </a:r>
+            <a:r>
+              <a:rPr lang="en-US" dirty="0" smtClean="0"/>
+              <a:t>(</a:t>
+            </a:r>
+            <a:r>
+              <a:rPr lang="en-US" dirty="0"/>
+              <a:t>c</a:t>
+            </a:r>
+            <a:r>
+              <a:rPr lang="en-US" baseline="-25000" dirty="0"/>
+              <a:t>1</a:t>
+            </a:r>
+            <a:r>
+              <a:rPr lang="en-US" dirty="0" smtClean="0"/>
+              <a:t>)</a:t>
+            </a:r>
+            <a:endParaRPr lang="en-US" dirty="0"/>
+          </a:p>
+        </p:txBody>
+      </p:sp>
+      <p:sp>
+        <p:nvSpPr>
+          <p:cNvPr id="3" name="Title 2"/>
+          <p:cNvSpPr>
+            <a:spLocks noGrp="1"/>
+          </p:cNvSpPr>
+          <p:nvPr>
+            <p:ph type="title"/>
+          </p:nvPr>
+        </p:nvSpPr>
+        <p:spPr/>
+        <p:txBody>
+          <a:bodyPr/>
+          <a:lstStyle/>
+          <a:p>
+            <a:r>
+              <a:rPr lang="en-US" dirty="0" err="1" smtClean="0"/>
+              <a:t>Protocolo</a:t>
+            </a:r>
+            <a:r>
+              <a:rPr lang="en-US" dirty="0" smtClean="0"/>
+              <a:t> CPA-</a:t>
+            </a:r>
+            <a:r>
+              <a:rPr lang="en-US" dirty="0" err="1" smtClean="0"/>
+              <a:t>Seguro</a:t>
+            </a:r>
+            <a:endParaRPr lang="en-US" dirty="0"/>
+          </a:p>
+        </p:txBody>
+      </p:sp>
+    </p:spTree>
+    <p:extLst>
+      <p:ext uri="{BB962C8B-B14F-4D97-AF65-F5344CB8AC3E}">
+        <p14:creationId xmlns:p14="http://schemas.microsoft.com/office/powerpoint/2010/main" val="2437375245"/>
+      </p:ext>
+    </p:extLst>
+  </p:cSld>
+  <p:clrMapOvr>
+    <a:masterClrMapping/>
+  </p:clrMapOvr>
+</p:sld>
+</file>
+
+<file path=ppt/slides/slide27.xml><?xml version="1.0" encoding="utf-8"?>
+<p:sld xmlns:a="http://schemas.openxmlformats.org/drawingml/2006/main" xmlns:r="http://schemas.openxmlformats.org/officeDocument/2006/relationships" xmlns:p="http://schemas.openxmlformats.org/presentationml/2006/main">
+  <p:cSld>
+    <p:spTree>
+      <p:nvGrpSpPr>
+        <p:cNvPr id="1" name=""/>
+        <p:cNvGrpSpPr/>
+        <p:nvPr/>
+      </p:nvGrpSpPr>
+      <p:grpSpPr>
+        <a:xfrm>
+          <a:off x="0" y="0"/>
+          <a:ext cx="0" cy="0"/>
+          <a:chOff x="0" y="0"/>
+          <a:chExt cx="0" cy="0"/>
+        </a:xfrm>
+      </p:grpSpPr>
+      <p:sp>
+        <p:nvSpPr>
+          <p:cNvPr id="3" name="Title 2"/>
+          <p:cNvSpPr>
+            <a:spLocks noGrp="1"/>
+          </p:cNvSpPr>
+          <p:nvPr>
+            <p:ph type="title"/>
+          </p:nvPr>
+        </p:nvSpPr>
+        <p:spPr/>
+        <p:txBody>
+          <a:bodyPr/>
+          <a:lstStyle/>
+          <a:p>
+            <a:endParaRPr lang="en-US"/>
+          </a:p>
+        </p:txBody>
+      </p:sp>
+      <p:pic>
+        <p:nvPicPr>
+          <p:cNvPr id="1026" name="Picture 2"/>
+          <p:cNvPicPr>
+            <a:picLocks noGrp="1" noChangeAspect="1" noChangeArrowheads="1"/>
+          </p:cNvPicPr>
+          <p:nvPr>
+            <p:ph idx="1"/>
+          </p:nvPr>
+        </p:nvPicPr>
+        <p:blipFill rotWithShape="1">
+          <a:blip r:embed="rId2">
+            <a:extLst>
+              <a:ext uri="{28A0092B-C50C-407E-A947-70E740481C1C}">
+                <a14:useLocalDpi xmlns:a14="http://schemas.microsoft.com/office/drawing/2010/main" val="0"/>
+              </a:ext>
+            </a:extLst>
+          </a:blip>
+          <a:srcRect l="10101" t="28248" r="28972" b="13200"/>
+          <a:stretch/>
+        </p:blipFill>
+        <p:spPr bwMode="auto">
+          <a:xfrm>
+            <a:off x="685800" y="914400"/>
+            <a:ext cx="7924800" cy="4284048"/>
+          </a:xfrm>
+          <a:prstGeom prst="rect">
+            <a:avLst/>
+          </a:prstGeom>
+          <a:noFill/>
+          <a:ln>
+            <a:noFill/>
+          </a:ln>
+          <a:effectLst/>
+          <a:extLst>
+            <a:ext uri="{909E8E84-426E-40DD-AFC4-6F175D3DCCD1}">
+              <a14:hiddenFill xmlns:a14="http://schemas.microsoft.com/office/drawing/2010/main">
+                <a:solidFill>
+                  <a:schemeClr val="accent1"/>
+                </a:solidFill>
+              </a14:hiddenFill>
+            </a:ext>
+            <a:ext uri="{91240B29-F687-4F45-9708-019B960494DF}">
+              <a14:hiddenLine xmlns:a14="http://schemas.microsoft.com/office/drawing/2010/main" w="9525">
+                <a:solidFill>
+                  <a:schemeClr val="tx1"/>
+                </a:solidFill>
+                <a:miter lim="800000"/>
+                <a:headEnd/>
+                <a:tailEnd/>
+              </a14:hiddenLine>
+            </a:ext>
+            <a:ext uri="{AF507438-7753-43E0-B8FC-AC1667EBCBE1}">
+              <a14:hiddenEffects xmlns:a14="http://schemas.microsoft.com/office/drawing/2010/main">
+                <a:effectLst>
+                  <a:outerShdw dist="35921" dir="2700000" algn="ctr" rotWithShape="0">
+                    <a:schemeClr val="bg2"/>
+                  </a:outerShdw>
+                </a:effectLst>
+              </a14:hiddenEffects>
+            </a:ext>
+          </a:extLst>
+        </p:spPr>
+      </p:pic>
+    </p:spTree>
+    <p:extLst>
+      <p:ext uri="{BB962C8B-B14F-4D97-AF65-F5344CB8AC3E}">
+        <p14:creationId xmlns:p14="http://schemas.microsoft.com/office/powerpoint/2010/main" val="2430611076"/>
+      </p:ext>
+    </p:extLst>
+  </p:cSld>
+  <p:clrMapOvr>
+    <a:masterClrMapping/>
+  </p:clrMapOvr>
 </p:sld>
 </file>
 

</xml_diff>